<commit_message>
FINAL COMIT / finale presentatie / video
</commit_message>
<xml_diff>
--- a/Locomotor zeppehjhyjyjlin - Copy.pptx
+++ b/Locomotor zeppehjhyjyjlin - Copy.pptx
@@ -125,7 +125,7 @@
   </p:defaultTextStyle>
   <p:extLst>
     <p:ext uri="{EFAFB233-063F-42B5-8137-9DF3F51BA10A}">
-      <p15:sldGuideLst xmlns="" xmlns:p15="http://schemas.microsoft.com/office/powerpoint/2012/main">
+      <p15:sldGuideLst xmlns:p15="http://schemas.microsoft.com/office/powerpoint/2012/main">
         <p15:guide id="1" orient="horz" pos="2160">
           <p15:clr>
             <a:srgbClr val="A4A3A4"/>
@@ -224,7 +224,7 @@
           <a:p>
             <a:fld id="{B8F1C6B1-E798-4F78-8F95-F492F9E7C04E}" type="datetimeFigureOut">
               <a:rPr lang="nl-BE" smtClean="0"/>
-              <a:t>12/05/2014</a:t>
+              <a:t>13/05/2014</a:t>
             </a:fld>
             <a:endParaRPr lang="nl-BE"/>
           </a:p>
@@ -860,13 +860,8 @@
           <a:p>
             <a:r>
               <a:rPr lang="nl-BE" baseline="0" dirty="0" smtClean="0"/>
-              <a:t>Image </a:t>
-            </a:r>
-            <a:r>
-              <a:rPr lang="nl-BE" baseline="0" dirty="0" smtClean="0"/>
-              <a:t>recognition, PID, RSA, Communcation</a:t>
-            </a:r>
-            <a:endParaRPr lang="nl-BE" baseline="0" dirty="0" smtClean="0"/>
+              <a:t>Image recognition, PID, RSA, Communcation</a:t>
+            </a:r>
           </a:p>
           <a:p>
             <a:endParaRPr lang="nl-BE" baseline="0" dirty="0" smtClean="0"/>
@@ -1008,11 +1003,7 @@
           <a:p>
             <a:r>
               <a:rPr lang="nl-BE" baseline="0" dirty="0" smtClean="0"/>
-              <a:t>Java/opencv -&gt; not much examples on the </a:t>
-            </a:r>
-            <a:r>
-              <a:rPr lang="nl-BE" baseline="0" dirty="0" smtClean="0"/>
-              <a:t>web</a:t>
+              <a:t>Java/opencv -&gt; not much examples on the web</a:t>
             </a:r>
           </a:p>
           <a:p>
@@ -2180,7 +2171,7 @@
           <a:p>
             <a:fld id="{74A92653-78F6-48B2-A1B6-172593356CAE}" type="datetime1">
               <a:rPr lang="nl-BE" smtClean="0"/>
-              <a:t>12/05/2014</a:t>
+              <a:t>13/05/2014</a:t>
             </a:fld>
             <a:endParaRPr lang="nl-BE"/>
           </a:p>
@@ -2379,7 +2370,7 @@
           <a:p>
             <a:fld id="{7D9A5976-105A-4054-AA20-A7FB287B8DA9}" type="datetime1">
               <a:rPr lang="nl-BE" smtClean="0"/>
-              <a:t>12/05/2014</a:t>
+              <a:t>13/05/2014</a:t>
             </a:fld>
             <a:endParaRPr lang="nl-BE"/>
           </a:p>
@@ -2569,7 +2560,7 @@
           <a:p>
             <a:fld id="{96C4CF12-465C-4D7F-BC6D-04CF3C693CC5}" type="datetime1">
               <a:rPr lang="nl-BE" smtClean="0"/>
-              <a:t>12/05/2014</a:t>
+              <a:t>13/05/2014</a:t>
             </a:fld>
             <a:endParaRPr lang="nl-BE"/>
           </a:p>
@@ -2761,7 +2752,7 @@
           <a:p>
             <a:fld id="{639AE3C5-7353-4A21-8DC3-DD3C7D5797BE}" type="datetime1">
               <a:rPr lang="nl-BE" smtClean="0"/>
-              <a:t>12/05/2014</a:t>
+              <a:t>13/05/2014</a:t>
             </a:fld>
             <a:endParaRPr lang="nl-BE"/>
           </a:p>
@@ -2987,7 +2978,7 @@
           <a:p>
             <a:fld id="{297E0899-4175-4E2E-8557-4C2AD419689C}" type="datetime1">
               <a:rPr lang="nl-BE" smtClean="0"/>
-              <a:t>12/05/2014</a:t>
+              <a:t>13/05/2014</a:t>
             </a:fld>
             <a:endParaRPr lang="nl-BE"/>
           </a:p>
@@ -3278,7 +3269,7 @@
           <a:p>
             <a:fld id="{CEBACCEB-A63D-4B6F-94BE-EB099899E23D}" type="datetime1">
               <a:rPr lang="nl-BE" smtClean="0"/>
-              <a:t>12/05/2014</a:t>
+              <a:t>13/05/2014</a:t>
             </a:fld>
             <a:endParaRPr lang="nl-BE"/>
           </a:p>
@@ -3709,7 +3700,7 @@
           <a:p>
             <a:fld id="{B0229254-B441-4E69-BA50-BA10E8312C3F}" type="datetime1">
               <a:rPr lang="nl-BE" smtClean="0"/>
-              <a:t>12/05/2014</a:t>
+              <a:t>13/05/2014</a:t>
             </a:fld>
             <a:endParaRPr lang="nl-BE"/>
           </a:p>
@@ -3835,7 +3826,7 @@
           <a:p>
             <a:fld id="{49A3446B-0B64-4E9D-A07F-2528891CA90E}" type="datetime1">
               <a:rPr lang="nl-BE" smtClean="0"/>
-              <a:t>12/05/2014</a:t>
+              <a:t>13/05/2014</a:t>
             </a:fld>
             <a:endParaRPr lang="nl-BE"/>
           </a:p>
@@ -3938,7 +3929,7 @@
           <a:p>
             <a:fld id="{868F686B-C977-41AC-85E9-AA1F4DD5361E}" type="datetime1">
               <a:rPr lang="nl-BE" smtClean="0"/>
-              <a:t>12/05/2014</a:t>
+              <a:t>13/05/2014</a:t>
             </a:fld>
             <a:endParaRPr lang="nl-BE"/>
           </a:p>
@@ -4207,7 +4198,7 @@
           <a:p>
             <a:fld id="{D3D6A380-7D6E-4D00-8204-5BFD40933916}" type="datetime1">
               <a:rPr lang="nl-BE" smtClean="0"/>
-              <a:t>12/05/2014</a:t>
+              <a:t>13/05/2014</a:t>
             </a:fld>
             <a:endParaRPr lang="nl-BE"/>
           </a:p>
@@ -4571,7 +4562,7 @@
           <a:p>
             <a:fld id="{57C0D660-2BB1-49B0-BEC1-071FA96A7704}" type="datetime1">
               <a:rPr lang="nl-BE" smtClean="0"/>
-              <a:t>12/05/2014</a:t>
+              <a:t>13/05/2014</a:t>
             </a:fld>
             <a:endParaRPr lang="nl-BE"/>
           </a:p>
@@ -4926,7 +4917,7 @@
           <a:p>
             <a:fld id="{A713CA57-72A9-418B-8466-D46DDB5F1D54}" type="datetime1">
               <a:rPr lang="nl-BE" smtClean="0"/>
-              <a:t>12/05/2014</a:t>
+              <a:t>13/05/2014</a:t>
             </a:fld>
             <a:endParaRPr lang="nl-BE"/>
           </a:p>
@@ -5785,6 +5776,18 @@
   <p:clrMapOvr>
     <a:masterClrMapping/>
   </p:clrMapOvr>
+  <mc:AlternateContent xmlns:mc="http://schemas.openxmlformats.org/markup-compatibility/2006">
+    <mc:Choice xmlns:p14="http://schemas.microsoft.com/office/powerpoint/2010/main" Requires="p14">
+      <p:transition>
+        <p14:pan dir="u"/>
+      </p:transition>
+    </mc:Choice>
+    <mc:Fallback>
+      <p:transition>
+        <p:fade/>
+      </p:transition>
+    </mc:Fallback>
+  </mc:AlternateContent>
   <p:timing>
     <p:tnLst>
       <p:par>
@@ -6011,12 +6014,16 @@
   <p:clrMapOvr>
     <a:masterClrMapping/>
   </p:clrMapOvr>
-  <mc:AlternateContent xmlns:mc="http://schemas.openxmlformats.org/markup-compatibility/2006" xmlns:p14="http://schemas.microsoft.com/office/powerpoint/2010/main">
-    <mc:Choice Requires="p14">
-      <p:transition spd="slow" p14:dur="2000"/>
+  <mc:AlternateContent xmlns:mc="http://schemas.openxmlformats.org/markup-compatibility/2006">
+    <mc:Choice xmlns:p14="http://schemas.microsoft.com/office/powerpoint/2010/main" Requires="p14">
+      <p:transition>
+        <p14:pan dir="u"/>
+      </p:transition>
     </mc:Choice>
-    <mc:Fallback xmlns="">
-      <p:transition spd="slow"/>
+    <mc:Fallback>
+      <p:transition>
+        <p:fade/>
+      </p:transition>
     </mc:Fallback>
   </mc:AlternateContent>
   <p:timing>
@@ -6131,12 +6138,16 @@
   <p:clrMapOvr>
     <a:masterClrMapping/>
   </p:clrMapOvr>
-  <mc:AlternateContent xmlns:mc="http://schemas.openxmlformats.org/markup-compatibility/2006" xmlns:p14="http://schemas.microsoft.com/office/powerpoint/2010/main">
-    <mc:Choice Requires="p14">
-      <p:transition spd="slow" p14:dur="2000"/>
+  <mc:AlternateContent xmlns:mc="http://schemas.openxmlformats.org/markup-compatibility/2006">
+    <mc:Choice xmlns:p14="http://schemas.microsoft.com/office/powerpoint/2010/main" Requires="p14">
+      <p:transition>
+        <p14:pan dir="u"/>
+      </p:transition>
     </mc:Choice>
-    <mc:Fallback xmlns="">
-      <p:transition spd="slow"/>
+    <mc:Fallback>
+      <p:transition>
+        <p:fade/>
+      </p:transition>
     </mc:Fallback>
   </mc:AlternateContent>
   <p:timing>
@@ -6341,12 +6352,16 @@
   <p:clrMapOvr>
     <a:masterClrMapping/>
   </p:clrMapOvr>
-  <mc:AlternateContent xmlns:mc="http://schemas.openxmlformats.org/markup-compatibility/2006" xmlns:p14="http://schemas.microsoft.com/office/powerpoint/2010/main">
-    <mc:Choice Requires="p14">
-      <p:transition spd="slow" p14:dur="2000"/>
+  <mc:AlternateContent xmlns:mc="http://schemas.openxmlformats.org/markup-compatibility/2006">
+    <mc:Choice xmlns:p14="http://schemas.microsoft.com/office/powerpoint/2010/main" Requires="p14">
+      <p:transition>
+        <p14:pan dir="u"/>
+      </p:transition>
     </mc:Choice>
-    <mc:Fallback xmlns="">
-      <p:transition spd="slow"/>
+    <mc:Fallback>
+      <p:transition>
+        <p:fade/>
+      </p:transition>
     </mc:Fallback>
   </mc:AlternateContent>
   <p:timing>
@@ -6514,12 +6529,16 @@
   <p:clrMapOvr>
     <a:masterClrMapping/>
   </p:clrMapOvr>
-  <mc:AlternateContent xmlns:mc="http://schemas.openxmlformats.org/markup-compatibility/2006" xmlns:p14="http://schemas.microsoft.com/office/powerpoint/2010/main">
-    <mc:Choice Requires="p14">
-      <p:transition spd="slow" p14:dur="2000"/>
+  <mc:AlternateContent xmlns:mc="http://schemas.openxmlformats.org/markup-compatibility/2006">
+    <mc:Choice xmlns:p14="http://schemas.microsoft.com/office/powerpoint/2010/main" Requires="p14">
+      <p:transition>
+        <p14:pan dir="u"/>
+      </p:transition>
     </mc:Choice>
-    <mc:Fallback xmlns="">
-      <p:transition spd="slow"/>
+    <mc:Fallback>
+      <p:transition>
+        <p:fade/>
+      </p:transition>
     </mc:Fallback>
   </mc:AlternateContent>
   <p:timing>
@@ -6632,12 +6651,16 @@
   <p:clrMapOvr>
     <a:masterClrMapping/>
   </p:clrMapOvr>
-  <mc:AlternateContent xmlns:mc="http://schemas.openxmlformats.org/markup-compatibility/2006" xmlns:p14="http://schemas.microsoft.com/office/powerpoint/2010/main">
-    <mc:Choice Requires="p14">
-      <p:transition spd="slow" p14:dur="2000"/>
+  <mc:AlternateContent xmlns:mc="http://schemas.openxmlformats.org/markup-compatibility/2006">
+    <mc:Choice xmlns:p14="http://schemas.microsoft.com/office/powerpoint/2010/main" Requires="p14">
+      <p:transition>
+        <p14:pan dir="u"/>
+      </p:transition>
     </mc:Choice>
-    <mc:Fallback xmlns="">
-      <p:transition spd="slow"/>
+    <mc:Fallback>
+      <p:transition>
+        <p:fade/>
+      </p:transition>
     </mc:Fallback>
   </mc:AlternateContent>
   <p:timing>
@@ -6848,12 +6871,16 @@
   <p:clrMapOvr>
     <a:masterClrMapping/>
   </p:clrMapOvr>
-  <mc:AlternateContent xmlns:mc="http://schemas.openxmlformats.org/markup-compatibility/2006" xmlns:p14="http://schemas.microsoft.com/office/powerpoint/2010/main">
-    <mc:Choice Requires="p14">
-      <p:transition spd="slow" p14:dur="2000"/>
+  <mc:AlternateContent xmlns:mc="http://schemas.openxmlformats.org/markup-compatibility/2006">
+    <mc:Choice xmlns:p14="http://schemas.microsoft.com/office/powerpoint/2010/main" Requires="p14">
+      <p:transition>
+        <p14:pan dir="u"/>
+      </p:transition>
     </mc:Choice>
-    <mc:Fallback xmlns="">
-      <p:transition spd="slow"/>
+    <mc:Fallback>
+      <p:transition>
+        <p:fade/>
+      </p:transition>
     </mc:Fallback>
   </mc:AlternateContent>
   <p:timing>
@@ -7171,12 +7198,16 @@
   <p:clrMapOvr>
     <a:masterClrMapping/>
   </p:clrMapOvr>
-  <mc:AlternateContent xmlns:mc="http://schemas.openxmlformats.org/markup-compatibility/2006" xmlns:p14="http://schemas.microsoft.com/office/powerpoint/2010/main">
-    <mc:Choice Requires="p14">
-      <p:transition spd="slow" p14:dur="2000"/>
+  <mc:AlternateContent xmlns:mc="http://schemas.openxmlformats.org/markup-compatibility/2006">
+    <mc:Choice xmlns:p14="http://schemas.microsoft.com/office/powerpoint/2010/main" Requires="p14">
+      <p:transition>
+        <p14:pan dir="u"/>
+      </p:transition>
     </mc:Choice>
-    <mc:Fallback xmlns="">
-      <p:transition spd="slow"/>
+    <mc:Fallback>
+      <p:transition>
+        <p:fade/>
+      </p:transition>
     </mc:Fallback>
   </mc:AlternateContent>
   <p:timing>
@@ -7365,12 +7396,16 @@
   <p:clrMapOvr>
     <a:masterClrMapping/>
   </p:clrMapOvr>
-  <mc:AlternateContent xmlns:mc="http://schemas.openxmlformats.org/markup-compatibility/2006" xmlns:p14="http://schemas.microsoft.com/office/powerpoint/2010/main">
-    <mc:Choice Requires="p14">
-      <p:transition spd="slow" p14:dur="2000"/>
+  <mc:AlternateContent xmlns:mc="http://schemas.openxmlformats.org/markup-compatibility/2006">
+    <mc:Choice xmlns:p14="http://schemas.microsoft.com/office/powerpoint/2010/main" Requires="p14">
+      <p:transition>
+        <p14:pan dir="u"/>
+      </p:transition>
     </mc:Choice>
-    <mc:Fallback xmlns="">
-      <p:transition spd="slow"/>
+    <mc:Fallback>
+      <p:transition>
+        <p:fade/>
+      </p:transition>
     </mc:Fallback>
   </mc:AlternateContent>
   <p:timing>
@@ -7537,12 +7572,16 @@
   <p:clrMapOvr>
     <a:masterClrMapping/>
   </p:clrMapOvr>
-  <mc:AlternateContent xmlns:mc="http://schemas.openxmlformats.org/markup-compatibility/2006" xmlns:p14="http://schemas.microsoft.com/office/powerpoint/2010/main">
-    <mc:Choice Requires="p14">
-      <p:transition spd="slow" p14:dur="2000"/>
+  <mc:AlternateContent xmlns:mc="http://schemas.openxmlformats.org/markup-compatibility/2006">
+    <mc:Choice xmlns:p14="http://schemas.microsoft.com/office/powerpoint/2010/main" Requires="p14">
+      <p:transition>
+        <p14:pan dir="u"/>
+      </p:transition>
     </mc:Choice>
-    <mc:Fallback xmlns="">
-      <p:transition spd="slow"/>
+    <mc:Fallback>
+      <p:transition>
+        <p:fade/>
+      </p:transition>
     </mc:Fallback>
   </mc:AlternateContent>
   <p:timing>
@@ -7662,12 +7701,16 @@
   <p:clrMapOvr>
     <a:masterClrMapping/>
   </p:clrMapOvr>
-  <mc:AlternateContent xmlns:mc="http://schemas.openxmlformats.org/markup-compatibility/2006" xmlns:p14="http://schemas.microsoft.com/office/powerpoint/2010/main">
-    <mc:Choice Requires="p14">
-      <p:transition spd="slow" p14:dur="2000"/>
+  <mc:AlternateContent xmlns:mc="http://schemas.openxmlformats.org/markup-compatibility/2006">
+    <mc:Choice xmlns:p14="http://schemas.microsoft.com/office/powerpoint/2010/main" Requires="p14">
+      <p:transition>
+        <p14:pan dir="u"/>
+      </p:transition>
     </mc:Choice>
-    <mc:Fallback xmlns="">
-      <p:transition spd="slow"/>
+    <mc:Fallback>
+      <p:transition>
+        <p:fade/>
+      </p:transition>
     </mc:Fallback>
   </mc:AlternateContent>
   <p:timing>
@@ -7818,12 +7861,16 @@
   <p:clrMapOvr>
     <a:masterClrMapping/>
   </p:clrMapOvr>
-  <mc:AlternateContent xmlns:mc="http://schemas.openxmlformats.org/markup-compatibility/2006" xmlns:p14="http://schemas.microsoft.com/office/powerpoint/2010/main">
-    <mc:Choice Requires="p14">
-      <p:transition spd="slow" p14:dur="2000"/>
+  <mc:AlternateContent xmlns:mc="http://schemas.openxmlformats.org/markup-compatibility/2006">
+    <mc:Choice xmlns:p14="http://schemas.microsoft.com/office/powerpoint/2010/main" Requires="p14">
+      <p:transition>
+        <p14:pan dir="u"/>
+      </p:transition>
     </mc:Choice>
-    <mc:Fallback xmlns="">
-      <p:transition spd="slow"/>
+    <mc:Fallback>
+      <p:transition>
+        <p:fade/>
+      </p:transition>
     </mc:Fallback>
   </mc:AlternateContent>
   <p:timing>
@@ -7886,7 +7933,12 @@
             <p:ph idx="1"/>
           </p:nvPr>
         </p:nvSpPr>
-        <p:spPr/>
+        <p:spPr>
+          <a:xfrm>
+            <a:off x="457200" y="1609416"/>
+            <a:ext cx="5500870" cy="1954844"/>
+          </a:xfrm>
+        </p:spPr>
         <p:txBody>
           <a:bodyPr/>
           <a:lstStyle/>
@@ -7934,25 +7986,7 @@
               <a:rPr lang="nl-BE" dirty="0" smtClean="0"/>
               <a:t>…</a:t>
             </a:r>
-          </a:p>
-          <a:p>
-            <a:pPr lvl="1"/>
-            <a:endParaRPr lang="nl-BE" dirty="0"/>
-          </a:p>
-          <a:p>
-            <a:pPr lvl="1"/>
             <a:endParaRPr lang="nl-BE" dirty="0" smtClean="0"/>
-          </a:p>
-          <a:p>
-            <a:pPr lvl="1"/>
-            <a:endParaRPr lang="nl-BE" dirty="0"/>
-          </a:p>
-          <a:p>
-            <a:pPr lvl="1"/>
-            <a:r>
-              <a:rPr lang="nl-BE" dirty="0" smtClean="0"/>
-              <a:t>ANIMATION</a:t>
-            </a:r>
           </a:p>
           <a:p>
             <a:pPr lvl="1"/>
@@ -7986,6 +8020,174 @@
           </a:p>
         </p:txBody>
       </p:sp>
+      <p:pic>
+        <p:nvPicPr>
+          <p:cNvPr id="6" name="Picture 5"/>
+          <p:cNvPicPr>
+            <a:picLocks noChangeAspect="1"/>
+          </p:cNvPicPr>
+          <p:nvPr/>
+        </p:nvPicPr>
+        <p:blipFill>
+          <a:blip r:embed="rId3" cstate="print">
+            <a:extLst>
+              <a:ext uri="{28A0092B-C50C-407E-A947-70E740481C1C}">
+                <a14:useLocalDpi xmlns:a14="http://schemas.microsoft.com/office/drawing/2010/main" val="0"/>
+              </a:ext>
+            </a:extLst>
+          </a:blip>
+          <a:stretch>
+            <a:fillRect/>
+          </a:stretch>
+        </p:blipFill>
+        <p:spPr>
+          <a:xfrm>
+            <a:off x="5148064" y="5020615"/>
+            <a:ext cx="734188" cy="632463"/>
+          </a:xfrm>
+          <a:prstGeom prst="rect">
+            <a:avLst/>
+          </a:prstGeom>
+        </p:spPr>
+      </p:pic>
+      <p:pic>
+        <p:nvPicPr>
+          <p:cNvPr id="8" name="Picture 7"/>
+          <p:cNvPicPr>
+            <a:picLocks noChangeAspect="1"/>
+          </p:cNvPicPr>
+          <p:nvPr/>
+        </p:nvPicPr>
+        <p:blipFill>
+          <a:blip r:embed="rId4" cstate="print">
+            <a:extLst>
+              <a:ext uri="{28A0092B-C50C-407E-A947-70E740481C1C}">
+                <a14:useLocalDpi xmlns:a14="http://schemas.microsoft.com/office/drawing/2010/main" val="0"/>
+              </a:ext>
+            </a:extLst>
+          </a:blip>
+          <a:stretch>
+            <a:fillRect/>
+          </a:stretch>
+        </p:blipFill>
+        <p:spPr>
+          <a:xfrm>
+            <a:off x="6545616" y="3564260"/>
+            <a:ext cx="1468776" cy="936632"/>
+          </a:xfrm>
+          <a:prstGeom prst="rect">
+            <a:avLst/>
+          </a:prstGeom>
+        </p:spPr>
+      </p:pic>
+      <p:pic>
+        <p:nvPicPr>
+          <p:cNvPr id="9" name="Picture 8"/>
+          <p:cNvPicPr>
+            <a:picLocks noChangeAspect="1"/>
+          </p:cNvPicPr>
+          <p:nvPr/>
+        </p:nvPicPr>
+        <p:blipFill>
+          <a:blip r:embed="rId5"/>
+          <a:stretch>
+            <a:fillRect/>
+          </a:stretch>
+        </p:blipFill>
+        <p:spPr>
+          <a:xfrm>
+            <a:off x="5072245" y="6256827"/>
+            <a:ext cx="885825" cy="219075"/>
+          </a:xfrm>
+          <a:prstGeom prst="rect">
+            <a:avLst/>
+          </a:prstGeom>
+        </p:spPr>
+      </p:pic>
+      <p:pic>
+        <p:nvPicPr>
+          <p:cNvPr id="10" name="Picture 9"/>
+          <p:cNvPicPr>
+            <a:picLocks noChangeAspect="1"/>
+          </p:cNvPicPr>
+          <p:nvPr/>
+        </p:nvPicPr>
+        <p:blipFill>
+          <a:blip r:embed="rId6" cstate="print">
+            <a:extLst>
+              <a:ext uri="{28A0092B-C50C-407E-A947-70E740481C1C}">
+                <a14:useLocalDpi xmlns:a14="http://schemas.microsoft.com/office/drawing/2010/main" val="0"/>
+              </a:ext>
+            </a:extLst>
+          </a:blip>
+          <a:stretch>
+            <a:fillRect/>
+          </a:stretch>
+        </p:blipFill>
+        <p:spPr>
+          <a:xfrm>
+            <a:off x="457200" y="3923070"/>
+            <a:ext cx="1268468" cy="380540"/>
+          </a:xfrm>
+          <a:prstGeom prst="rect">
+            <a:avLst/>
+          </a:prstGeom>
+        </p:spPr>
+      </p:pic>
+      <p:pic>
+        <p:nvPicPr>
+          <p:cNvPr id="11" name="Picture 10"/>
+          <p:cNvPicPr>
+            <a:picLocks noChangeAspect="1"/>
+          </p:cNvPicPr>
+          <p:nvPr/>
+        </p:nvPicPr>
+        <p:blipFill>
+          <a:blip r:embed="rId7"/>
+          <a:stretch>
+            <a:fillRect/>
+          </a:stretch>
+        </p:blipFill>
+        <p:spPr>
+          <a:xfrm>
+            <a:off x="6722791" y="3205322"/>
+            <a:ext cx="1114425" cy="190500"/>
+          </a:xfrm>
+          <a:prstGeom prst="rect">
+            <a:avLst/>
+          </a:prstGeom>
+        </p:spPr>
+      </p:pic>
+      <p:pic>
+        <p:nvPicPr>
+          <p:cNvPr id="12" name="Picture 11"/>
+          <p:cNvPicPr>
+            <a:picLocks noChangeAspect="1"/>
+          </p:cNvPicPr>
+          <p:nvPr/>
+        </p:nvPicPr>
+        <p:blipFill>
+          <a:blip r:embed="rId8" cstate="print">
+            <a:extLst>
+              <a:ext uri="{28A0092B-C50C-407E-A947-70E740481C1C}">
+                <a14:useLocalDpi xmlns:a14="http://schemas.microsoft.com/office/drawing/2010/main" val="0"/>
+              </a:ext>
+            </a:extLst>
+          </a:blip>
+          <a:stretch>
+            <a:fillRect/>
+          </a:stretch>
+        </p:blipFill>
+        <p:spPr>
+          <a:xfrm>
+            <a:off x="1728192" y="3776238"/>
+            <a:ext cx="683568" cy="512676"/>
+          </a:xfrm>
+          <a:prstGeom prst="rect">
+            <a:avLst/>
+          </a:prstGeom>
+        </p:spPr>
+      </p:pic>
     </p:spTree>
     <p:extLst>
       <p:ext uri="{BB962C8B-B14F-4D97-AF65-F5344CB8AC3E}">
@@ -7996,18 +8198,507 @@
   <p:clrMapOvr>
     <a:masterClrMapping/>
   </p:clrMapOvr>
-  <mc:AlternateContent xmlns:mc="http://schemas.openxmlformats.org/markup-compatibility/2006" xmlns:p14="http://schemas.microsoft.com/office/powerpoint/2010/main">
-    <mc:Choice Requires="p14">
-      <p:transition spd="slow" p14:dur="2000"/>
+  <mc:AlternateContent xmlns:mc="http://schemas.openxmlformats.org/markup-compatibility/2006">
+    <mc:Choice xmlns:p14="http://schemas.microsoft.com/office/powerpoint/2010/main" Requires="p14">
+      <p:transition>
+        <p14:pan dir="u"/>
+      </p:transition>
     </mc:Choice>
-    <mc:Fallback xmlns="">
-      <p:transition spd="slow"/>
+    <mc:Fallback>
+      <p:transition>
+        <p:fade/>
+      </p:transition>
     </mc:Fallback>
   </mc:AlternateContent>
   <p:timing>
     <p:tnLst>
       <p:par>
-        <p:cTn id="1" dur="indefinite" restart="never" nodeType="tmRoot"/>
+        <p:cTn id="1" dur="indefinite" restart="never" nodeType="tmRoot">
+          <p:childTnLst>
+            <p:seq concurrent="1" nextAc="seek">
+              <p:cTn id="2" dur="indefinite" nodeType="mainSeq">
+                <p:childTnLst>
+                  <p:par>
+                    <p:cTn id="3" fill="hold">
+                      <p:stCondLst>
+                        <p:cond delay="indefinite"/>
+                      </p:stCondLst>
+                      <p:childTnLst>
+                        <p:par>
+                          <p:cTn id="4" fill="hold">
+                            <p:stCondLst>
+                              <p:cond delay="0"/>
+                            </p:stCondLst>
+                            <p:childTnLst>
+                              <p:par>
+                                <p:cTn id="5" presetID="10" presetClass="entr" presetSubtype="0" fill="hold" nodeType="clickEffect">
+                                  <p:stCondLst>
+                                    <p:cond delay="0"/>
+                                  </p:stCondLst>
+                                  <p:childTnLst>
+                                    <p:set>
+                                      <p:cBhvr>
+                                        <p:cTn id="6" dur="1" fill="hold">
+                                          <p:stCondLst>
+                                            <p:cond delay="0"/>
+                                          </p:stCondLst>
+                                        </p:cTn>
+                                        <p:tgtEl>
+                                          <p:spTgt spid="12"/>
+                                        </p:tgtEl>
+                                        <p:attrNameLst>
+                                          <p:attrName>style.visibility</p:attrName>
+                                        </p:attrNameLst>
+                                      </p:cBhvr>
+                                      <p:to>
+                                        <p:strVal val="visible"/>
+                                      </p:to>
+                                    </p:set>
+                                    <p:animEffect transition="in" filter="fade">
+                                      <p:cBhvr>
+                                        <p:cTn id="7" dur="500"/>
+                                        <p:tgtEl>
+                                          <p:spTgt spid="12"/>
+                                        </p:tgtEl>
+                                      </p:cBhvr>
+                                    </p:animEffect>
+                                  </p:childTnLst>
+                                </p:cTn>
+                              </p:par>
+                            </p:childTnLst>
+                          </p:cTn>
+                        </p:par>
+                        <p:par>
+                          <p:cTn id="8" fill="hold">
+                            <p:stCondLst>
+                              <p:cond delay="500"/>
+                            </p:stCondLst>
+                            <p:childTnLst>
+                              <p:par>
+                                <p:cTn id="9" presetID="0" presetClass="path" presetSubtype="0" accel="50000" decel="50000" fill="hold" nodeType="afterEffect">
+                                  <p:stCondLst>
+                                    <p:cond delay="0"/>
+                                  </p:stCondLst>
+                                  <p:childTnLst>
+                                    <p:animMotion origin="layout" path="M -0.00208 -0.00185 L 0.56614 -0.00486 " pathEditMode="relative" rAng="0" ptsTypes="AA">
+                                      <p:cBhvr>
+                                        <p:cTn id="10" dur="1500" fill="hold"/>
+                                        <p:tgtEl>
+                                          <p:spTgt spid="12"/>
+                                        </p:tgtEl>
+                                        <p:attrNameLst>
+                                          <p:attrName>ppt_x</p:attrName>
+                                          <p:attrName>ppt_y</p:attrName>
+                                        </p:attrNameLst>
+                                      </p:cBhvr>
+                                      <p:rCtr x="28403" y="-162"/>
+                                    </p:animMotion>
+                                  </p:childTnLst>
+                                </p:cTn>
+                              </p:par>
+                              <p:par>
+                                <p:cTn id="11" presetID="22" presetClass="exit" presetSubtype="2" fill="hold" nodeType="withEffect">
+                                  <p:stCondLst>
+                                    <p:cond delay="1000"/>
+                                  </p:stCondLst>
+                                  <p:childTnLst>
+                                    <p:animEffect transition="out" filter="wipe(right)">
+                                      <p:cBhvr>
+                                        <p:cTn id="12" dur="500"/>
+                                        <p:tgtEl>
+                                          <p:spTgt spid="12"/>
+                                        </p:tgtEl>
+                                      </p:cBhvr>
+                                    </p:animEffect>
+                                    <p:set>
+                                      <p:cBhvr>
+                                        <p:cTn id="13" dur="1" fill="hold">
+                                          <p:stCondLst>
+                                            <p:cond delay="499"/>
+                                          </p:stCondLst>
+                                        </p:cTn>
+                                        <p:tgtEl>
+                                          <p:spTgt spid="12"/>
+                                        </p:tgtEl>
+                                        <p:attrNameLst>
+                                          <p:attrName>style.visibility</p:attrName>
+                                        </p:attrNameLst>
+                                      </p:cBhvr>
+                                      <p:to>
+                                        <p:strVal val="hidden"/>
+                                      </p:to>
+                                    </p:set>
+                                  </p:childTnLst>
+                                </p:cTn>
+                              </p:par>
+                            </p:childTnLst>
+                          </p:cTn>
+                        </p:par>
+                        <p:par>
+                          <p:cTn id="14" fill="hold">
+                            <p:stCondLst>
+                              <p:cond delay="2000"/>
+                            </p:stCondLst>
+                            <p:childTnLst>
+                              <p:par>
+                                <p:cTn id="15" presetID="10" presetClass="entr" presetSubtype="0" fill="hold" nodeType="afterEffect">
+                                  <p:stCondLst>
+                                    <p:cond delay="0"/>
+                                  </p:stCondLst>
+                                  <p:childTnLst>
+                                    <p:set>
+                                      <p:cBhvr>
+                                        <p:cTn id="16" dur="1" fill="hold">
+                                          <p:stCondLst>
+                                            <p:cond delay="0"/>
+                                          </p:stCondLst>
+                                        </p:cTn>
+                                        <p:tgtEl>
+                                          <p:spTgt spid="11"/>
+                                        </p:tgtEl>
+                                        <p:attrNameLst>
+                                          <p:attrName>style.visibility</p:attrName>
+                                        </p:attrNameLst>
+                                      </p:cBhvr>
+                                      <p:to>
+                                        <p:strVal val="visible"/>
+                                      </p:to>
+                                    </p:set>
+                                    <p:animEffect transition="in" filter="fade">
+                                      <p:cBhvr>
+                                        <p:cTn id="17" dur="500"/>
+                                        <p:tgtEl>
+                                          <p:spTgt spid="11"/>
+                                        </p:tgtEl>
+                                      </p:cBhvr>
+                                    </p:animEffect>
+                                  </p:childTnLst>
+                                </p:cTn>
+                              </p:par>
+                            </p:childTnLst>
+                          </p:cTn>
+                        </p:par>
+                        <p:par>
+                          <p:cTn id="18" fill="hold">
+                            <p:stCondLst>
+                              <p:cond delay="2500"/>
+                            </p:stCondLst>
+                            <p:childTnLst>
+                              <p:par>
+                                <p:cTn id="19" presetID="51" presetClass="path" presetSubtype="0" accel="50000" decel="50000" fill="hold" nodeType="afterEffect">
+                                  <p:stCondLst>
+                                    <p:cond delay="0"/>
+                                  </p:stCondLst>
+                                  <p:childTnLst>
+                                    <p:animMotion origin="layout" path="M -5.55556E-7 0 L -0.09028 0.08796 C -0.11059 0.10718 -0.10469 0.12407 -0.12205 0.16343 C -0.13958 0.20139 -0.19601 0.28403 -0.19444 0.32014 C -0.20226 0.37454 -0.19323 0.36505 -0.19844 0.42037 " pathEditMode="relative" rAng="0" ptsTypes="AAAAA">
+                                      <p:cBhvr>
+                                        <p:cTn id="20" dur="2000" fill="hold"/>
+                                        <p:tgtEl>
+                                          <p:spTgt spid="11"/>
+                                        </p:tgtEl>
+                                        <p:attrNameLst>
+                                          <p:attrName>ppt_x</p:attrName>
+                                          <p:attrName>ppt_y</p:attrName>
+                                        </p:attrNameLst>
+                                      </p:cBhvr>
+                                      <p:rCtr x="-9931" y="21019"/>
+                                    </p:animMotion>
+                                  </p:childTnLst>
+                                </p:cTn>
+                              </p:par>
+                              <p:par>
+                                <p:cTn id="21" presetID="22" presetClass="exit" presetSubtype="4" fill="hold" nodeType="withEffect">
+                                  <p:stCondLst>
+                                    <p:cond delay="1500"/>
+                                  </p:stCondLst>
+                                  <p:childTnLst>
+                                    <p:animEffect transition="out" filter="wipe(down)">
+                                      <p:cBhvr>
+                                        <p:cTn id="22" dur="500"/>
+                                        <p:tgtEl>
+                                          <p:spTgt spid="11"/>
+                                        </p:tgtEl>
+                                      </p:cBhvr>
+                                    </p:animEffect>
+                                    <p:set>
+                                      <p:cBhvr>
+                                        <p:cTn id="23" dur="1" fill="hold">
+                                          <p:stCondLst>
+                                            <p:cond delay="499"/>
+                                          </p:stCondLst>
+                                        </p:cTn>
+                                        <p:tgtEl>
+                                          <p:spTgt spid="11"/>
+                                        </p:tgtEl>
+                                        <p:attrNameLst>
+                                          <p:attrName>style.visibility</p:attrName>
+                                        </p:attrNameLst>
+                                      </p:cBhvr>
+                                      <p:to>
+                                        <p:strVal val="hidden"/>
+                                      </p:to>
+                                    </p:set>
+                                  </p:childTnLst>
+                                </p:cTn>
+                              </p:par>
+                            </p:childTnLst>
+                          </p:cTn>
+                        </p:par>
+                        <p:par>
+                          <p:cTn id="24" fill="hold">
+                            <p:stCondLst>
+                              <p:cond delay="4500"/>
+                            </p:stCondLst>
+                            <p:childTnLst>
+                              <p:par>
+                                <p:cTn id="25" presetID="32" presetClass="emph" presetSubtype="0" fill="hold" nodeType="afterEffect">
+                                  <p:stCondLst>
+                                    <p:cond delay="0"/>
+                                  </p:stCondLst>
+                                  <p:childTnLst>
+                                    <p:animRot by="120000">
+                                      <p:cBhvr>
+                                        <p:cTn id="26" dur="100" fill="hold">
+                                          <p:stCondLst>
+                                            <p:cond delay="0"/>
+                                          </p:stCondLst>
+                                        </p:cTn>
+                                        <p:tgtEl>
+                                          <p:spTgt spid="9"/>
+                                        </p:tgtEl>
+                                        <p:attrNameLst>
+                                          <p:attrName>r</p:attrName>
+                                        </p:attrNameLst>
+                                      </p:cBhvr>
+                                    </p:animRot>
+                                    <p:animRot by="-240000">
+                                      <p:cBhvr>
+                                        <p:cTn id="27" dur="200" fill="hold">
+                                          <p:stCondLst>
+                                            <p:cond delay="200"/>
+                                          </p:stCondLst>
+                                        </p:cTn>
+                                        <p:tgtEl>
+                                          <p:spTgt spid="9"/>
+                                        </p:tgtEl>
+                                        <p:attrNameLst>
+                                          <p:attrName>r</p:attrName>
+                                        </p:attrNameLst>
+                                      </p:cBhvr>
+                                    </p:animRot>
+                                    <p:animRot by="240000">
+                                      <p:cBhvr>
+                                        <p:cTn id="28" dur="200" fill="hold">
+                                          <p:stCondLst>
+                                            <p:cond delay="400"/>
+                                          </p:stCondLst>
+                                        </p:cTn>
+                                        <p:tgtEl>
+                                          <p:spTgt spid="9"/>
+                                        </p:tgtEl>
+                                        <p:attrNameLst>
+                                          <p:attrName>r</p:attrName>
+                                        </p:attrNameLst>
+                                      </p:cBhvr>
+                                    </p:animRot>
+                                    <p:animRot by="-240000">
+                                      <p:cBhvr>
+                                        <p:cTn id="29" dur="200" fill="hold">
+                                          <p:stCondLst>
+                                            <p:cond delay="600"/>
+                                          </p:stCondLst>
+                                        </p:cTn>
+                                        <p:tgtEl>
+                                          <p:spTgt spid="9"/>
+                                        </p:tgtEl>
+                                        <p:attrNameLst>
+                                          <p:attrName>r</p:attrName>
+                                        </p:attrNameLst>
+                                      </p:cBhvr>
+                                    </p:animRot>
+                                    <p:animRot by="120000">
+                                      <p:cBhvr>
+                                        <p:cTn id="30" dur="200" fill="hold">
+                                          <p:stCondLst>
+                                            <p:cond delay="800"/>
+                                          </p:stCondLst>
+                                        </p:cTn>
+                                        <p:tgtEl>
+                                          <p:spTgt spid="9"/>
+                                        </p:tgtEl>
+                                        <p:attrNameLst>
+                                          <p:attrName>r</p:attrName>
+                                        </p:attrNameLst>
+                                      </p:cBhvr>
+                                    </p:animRot>
+                                  </p:childTnLst>
+                                </p:cTn>
+                              </p:par>
+                            </p:childTnLst>
+                          </p:cTn>
+                        </p:par>
+                        <p:par>
+                          <p:cTn id="31" fill="hold">
+                            <p:stCondLst>
+                              <p:cond delay="5500"/>
+                            </p:stCondLst>
+                            <p:childTnLst>
+                              <p:par>
+                                <p:cTn id="32" presetID="22" presetClass="entr" presetSubtype="4" fill="hold" nodeType="afterEffect">
+                                  <p:stCondLst>
+                                    <p:cond delay="0"/>
+                                  </p:stCondLst>
+                                  <p:childTnLst>
+                                    <p:set>
+                                      <p:cBhvr>
+                                        <p:cTn id="33" dur="1" fill="hold">
+                                          <p:stCondLst>
+                                            <p:cond delay="0"/>
+                                          </p:stCondLst>
+                                        </p:cTn>
+                                        <p:tgtEl>
+                                          <p:spTgt spid="11"/>
+                                        </p:tgtEl>
+                                        <p:attrNameLst>
+                                          <p:attrName>style.visibility</p:attrName>
+                                        </p:attrNameLst>
+                                      </p:cBhvr>
+                                      <p:to>
+                                        <p:strVal val="visible"/>
+                                      </p:to>
+                                    </p:set>
+                                    <p:animEffect transition="in" filter="wipe(down)">
+                                      <p:cBhvr>
+                                        <p:cTn id="34" dur="500"/>
+                                        <p:tgtEl>
+                                          <p:spTgt spid="11"/>
+                                        </p:tgtEl>
+                                      </p:cBhvr>
+                                    </p:animEffect>
+                                  </p:childTnLst>
+                                </p:cTn>
+                              </p:par>
+                            </p:childTnLst>
+                          </p:cTn>
+                        </p:par>
+                        <p:par>
+                          <p:cTn id="35" fill="hold">
+                            <p:stCondLst>
+                              <p:cond delay="6000"/>
+                            </p:stCondLst>
+                            <p:childTnLst>
+                              <p:par>
+                                <p:cTn id="36" presetID="0" presetClass="path" presetSubtype="0" accel="50000" decel="50000" fill="hold" nodeType="afterEffect">
+                                  <p:stCondLst>
+                                    <p:cond delay="0"/>
+                                  </p:stCondLst>
+                                  <p:childTnLst>
+                                    <p:animMotion origin="layout" path="M -0.19844 0.42037 L -0.19636 0.33149 L -0.67344 0.1176 " pathEditMode="relative" ptsTypes="AAA">
+                                      <p:cBhvr>
+                                        <p:cTn id="37" dur="2000" fill="hold"/>
+                                        <p:tgtEl>
+                                          <p:spTgt spid="11"/>
+                                        </p:tgtEl>
+                                        <p:attrNameLst>
+                                          <p:attrName>ppt_x</p:attrName>
+                                          <p:attrName>ppt_y</p:attrName>
+                                        </p:attrNameLst>
+                                      </p:cBhvr>
+                                    </p:animMotion>
+                                  </p:childTnLst>
+                                </p:cTn>
+                              </p:par>
+                              <p:par>
+                                <p:cTn id="38" presetID="10" presetClass="exit" presetSubtype="0" fill="hold" nodeType="withEffect">
+                                  <p:stCondLst>
+                                    <p:cond delay="1500"/>
+                                  </p:stCondLst>
+                                  <p:childTnLst>
+                                    <p:animEffect transition="out" filter="fade">
+                                      <p:cBhvr>
+                                        <p:cTn id="39" dur="500"/>
+                                        <p:tgtEl>
+                                          <p:spTgt spid="11"/>
+                                        </p:tgtEl>
+                                      </p:cBhvr>
+                                    </p:animEffect>
+                                    <p:set>
+                                      <p:cBhvr>
+                                        <p:cTn id="40" dur="1" fill="hold">
+                                          <p:stCondLst>
+                                            <p:cond delay="499"/>
+                                          </p:stCondLst>
+                                        </p:cTn>
+                                        <p:tgtEl>
+                                          <p:spTgt spid="11"/>
+                                        </p:tgtEl>
+                                        <p:attrNameLst>
+                                          <p:attrName>style.visibility</p:attrName>
+                                        </p:attrNameLst>
+                                      </p:cBhvr>
+                                      <p:to>
+                                        <p:strVal val="hidden"/>
+                                      </p:to>
+                                    </p:set>
+                                  </p:childTnLst>
+                                </p:cTn>
+                              </p:par>
+                            </p:childTnLst>
+                          </p:cTn>
+                        </p:par>
+                        <p:par>
+                          <p:cTn id="41" fill="hold">
+                            <p:stCondLst>
+                              <p:cond delay="8000"/>
+                            </p:stCondLst>
+                            <p:childTnLst>
+                              <p:par>
+                                <p:cTn id="42" presetID="0" presetClass="path" presetSubtype="0" accel="50000" decel="50000" fill="hold" nodeType="afterEffect">
+                                  <p:stCondLst>
+                                    <p:cond delay="0"/>
+                                  </p:stCondLst>
+                                  <p:childTnLst>
+                                    <p:animMotion origin="layout" path="M 0.00278 0.00347 L 0.12153 0.00347 " pathEditMode="relative" rAng="0" ptsTypes="AA">
+                                      <p:cBhvr>
+                                        <p:cTn id="43" dur="2000" fill="hold"/>
+                                        <p:tgtEl>
+                                          <p:spTgt spid="10"/>
+                                        </p:tgtEl>
+                                        <p:attrNameLst>
+                                          <p:attrName>ppt_x</p:attrName>
+                                          <p:attrName>ppt_y</p:attrName>
+                                        </p:attrNameLst>
+                                      </p:cBhvr>
+                                      <p:rCtr x="5937" y="0"/>
+                                    </p:animMotion>
+                                  </p:childTnLst>
+                                </p:cTn>
+                              </p:par>
+                            </p:childTnLst>
+                          </p:cTn>
+                        </p:par>
+                      </p:childTnLst>
+                    </p:cTn>
+                  </p:par>
+                </p:childTnLst>
+              </p:cTn>
+              <p:prevCondLst>
+                <p:cond evt="onPrev" delay="0">
+                  <p:tgtEl>
+                    <p:sldTgt/>
+                  </p:tgtEl>
+                </p:cond>
+              </p:prevCondLst>
+              <p:nextCondLst>
+                <p:cond evt="onNext" delay="0">
+                  <p:tgtEl>
+                    <p:sldTgt/>
+                  </p:tgtEl>
+                </p:cond>
+              </p:nextCondLst>
+            </p:seq>
+          </p:childTnLst>
+        </p:cTn>
       </p:par>
     </p:tnLst>
   </p:timing>
@@ -8177,12 +8868,16 @@
   <p:clrMapOvr>
     <a:masterClrMapping/>
   </p:clrMapOvr>
-  <mc:AlternateContent xmlns:mc="http://schemas.openxmlformats.org/markup-compatibility/2006" xmlns:p14="http://schemas.microsoft.com/office/powerpoint/2010/main">
-    <mc:Choice Requires="p14">
-      <p:transition spd="slow" p14:dur="2000"/>
+  <mc:AlternateContent xmlns:mc="http://schemas.openxmlformats.org/markup-compatibility/2006">
+    <mc:Choice xmlns:p14="http://schemas.microsoft.com/office/powerpoint/2010/main" Requires="p14">
+      <p:transition>
+        <p14:pan dir="u"/>
+      </p:transition>
     </mc:Choice>
-    <mc:Fallback xmlns="">
-      <p:transition spd="slow"/>
+    <mc:Fallback>
+      <p:transition>
+        <p:fade/>
+      </p:transition>
     </mc:Fallback>
   </mc:AlternateContent>
   <p:timing>
@@ -8355,12 +9050,16 @@
   <p:clrMapOvr>
     <a:masterClrMapping/>
   </p:clrMapOvr>
-  <mc:AlternateContent xmlns:mc="http://schemas.openxmlformats.org/markup-compatibility/2006" xmlns:p14="http://schemas.microsoft.com/office/powerpoint/2010/main">
-    <mc:Choice Requires="p14">
-      <p:transition spd="slow" p14:dur="2000"/>
+  <mc:AlternateContent xmlns:mc="http://schemas.openxmlformats.org/markup-compatibility/2006">
+    <mc:Choice xmlns:p14="http://schemas.microsoft.com/office/powerpoint/2010/main" Requires="p14">
+      <p:transition>
+        <p14:pan dir="u"/>
+      </p:transition>
     </mc:Choice>
-    <mc:Fallback xmlns="">
-      <p:transition spd="slow"/>
+    <mc:Fallback>
+      <p:transition>
+        <p:fade/>
+      </p:transition>
     </mc:Fallback>
   </mc:AlternateContent>
   <p:timing>
@@ -8526,12 +9225,16 @@
   <p:clrMapOvr>
     <a:masterClrMapping/>
   </p:clrMapOvr>
-  <mc:AlternateContent xmlns:mc="http://schemas.openxmlformats.org/markup-compatibility/2006" xmlns:p14="http://schemas.microsoft.com/office/powerpoint/2010/main">
-    <mc:Choice Requires="p14">
-      <p:transition spd="slow" p14:dur="2000"/>
+  <mc:AlternateContent xmlns:mc="http://schemas.openxmlformats.org/markup-compatibility/2006">
+    <mc:Choice xmlns:p14="http://schemas.microsoft.com/office/powerpoint/2010/main" Requires="p14">
+      <p:transition>
+        <p14:pan dir="u"/>
+      </p:transition>
     </mc:Choice>
-    <mc:Fallback xmlns="">
-      <p:transition spd="slow"/>
+    <mc:Fallback>
+      <p:transition>
+        <p:fade/>
+      </p:transition>
     </mc:Fallback>
   </mc:AlternateContent>
   <p:timing>

</xml_diff>